<commit_message>
IP and Licences as separate episode
</commit_message>
<xml_diff>
--- a/instructors/Being_FAIR_Episode_v2.0.pptx
+++ b/instructors/Being_FAIR_Episode_v2.0.pptx
@@ -19,11 +19,10 @@
     <p:sldId id="271" r:id="rId13"/>
     <p:sldId id="274" r:id="rId14"/>
     <p:sldId id="273" r:id="rId15"/>
-    <p:sldId id="275" r:id="rId16"/>
-    <p:sldId id="276" r:id="rId17"/>
-    <p:sldId id="266" r:id="rId18"/>
-    <p:sldId id="277" r:id="rId19"/>
-    <p:sldId id="278" r:id="rId20"/>
+    <p:sldId id="276" r:id="rId16"/>
+    <p:sldId id="266" r:id="rId17"/>
+    <p:sldId id="277" r:id="rId18"/>
+    <p:sldId id="278" r:id="rId19"/>
   </p:sldIdLst>
   <p:sldSz cx="12192000" cy="6858000"/>
   <p:notesSz cx="6858000" cy="9144000"/>
@@ -296,7 +295,7 @@
             <a:fld id="{DE72BEAC-A25F-4480-8AFC-1D3E290F2CC8}" type="datetimeFigureOut">
               <a:rPr lang="en-GB" smtClean="0"/>
               <a:pPr/>
-              <a:t>14/10/2021</a:t>
+              <a:t>18/10/2021</a:t>
             </a:fld>
             <a:endParaRPr lang="en-GB"/>
           </a:p>
@@ -560,7 +559,7 @@
           <a:p>
             <a:fld id="{DE72BEAC-A25F-4480-8AFC-1D3E290F2CC8}" type="datetimeFigureOut">
               <a:rPr lang="en-GB" smtClean="0"/>
-              <a:t>14/10/2021</a:t>
+              <a:t>18/10/2021</a:t>
             </a:fld>
             <a:endParaRPr lang="en-GB"/>
           </a:p>
@@ -770,7 +769,7 @@
           <a:p>
             <a:fld id="{DE72BEAC-A25F-4480-8AFC-1D3E290F2CC8}" type="datetimeFigureOut">
               <a:rPr lang="en-GB" smtClean="0"/>
-              <a:t>14/10/2021</a:t>
+              <a:t>18/10/2021</a:t>
             </a:fld>
             <a:endParaRPr lang="en-GB"/>
           </a:p>
@@ -970,7 +969,7 @@
           <a:p>
             <a:fld id="{DE72BEAC-A25F-4480-8AFC-1D3E290F2CC8}" type="datetimeFigureOut">
               <a:rPr lang="en-GB" smtClean="0"/>
-              <a:t>14/10/2021</a:t>
+              <a:t>18/10/2021</a:t>
             </a:fld>
             <a:endParaRPr lang="en-GB"/>
           </a:p>
@@ -1246,7 +1245,7 @@
           <a:p>
             <a:fld id="{DE72BEAC-A25F-4480-8AFC-1D3E290F2CC8}" type="datetimeFigureOut">
               <a:rPr lang="en-GB" smtClean="0"/>
-              <a:t>14/10/2021</a:t>
+              <a:t>18/10/2021</a:t>
             </a:fld>
             <a:endParaRPr lang="en-GB"/>
           </a:p>
@@ -1514,7 +1513,7 @@
           <a:p>
             <a:fld id="{DE72BEAC-A25F-4480-8AFC-1D3E290F2CC8}" type="datetimeFigureOut">
               <a:rPr lang="en-GB" smtClean="0"/>
-              <a:t>14/10/2021</a:t>
+              <a:t>18/10/2021</a:t>
             </a:fld>
             <a:endParaRPr lang="en-GB"/>
           </a:p>
@@ -1929,7 +1928,7 @@
           <a:p>
             <a:fld id="{DE72BEAC-A25F-4480-8AFC-1D3E290F2CC8}" type="datetimeFigureOut">
               <a:rPr lang="en-GB" smtClean="0"/>
-              <a:t>14/10/2021</a:t>
+              <a:t>18/10/2021</a:t>
             </a:fld>
             <a:endParaRPr lang="en-GB"/>
           </a:p>
@@ -2071,7 +2070,7 @@
           <a:p>
             <a:fld id="{DE72BEAC-A25F-4480-8AFC-1D3E290F2CC8}" type="datetimeFigureOut">
               <a:rPr lang="en-GB" smtClean="0"/>
-              <a:t>14/10/2021</a:t>
+              <a:t>18/10/2021</a:t>
             </a:fld>
             <a:endParaRPr lang="en-GB"/>
           </a:p>
@@ -2184,7 +2183,7 @@
           <a:p>
             <a:fld id="{DE72BEAC-A25F-4480-8AFC-1D3E290F2CC8}" type="datetimeFigureOut">
               <a:rPr lang="en-GB" smtClean="0"/>
-              <a:t>14/10/2021</a:t>
+              <a:t>18/10/2021</a:t>
             </a:fld>
             <a:endParaRPr lang="en-GB"/>
           </a:p>
@@ -2497,7 +2496,7 @@
           <a:p>
             <a:fld id="{DE72BEAC-A25F-4480-8AFC-1D3E290F2CC8}" type="datetimeFigureOut">
               <a:rPr lang="en-GB" smtClean="0"/>
-              <a:t>14/10/2021</a:t>
+              <a:t>18/10/2021</a:t>
             </a:fld>
             <a:endParaRPr lang="en-GB"/>
           </a:p>
@@ -2786,7 +2785,7 @@
           <a:p>
             <a:fld id="{DE72BEAC-A25F-4480-8AFC-1D3E290F2CC8}" type="datetimeFigureOut">
               <a:rPr lang="en-GB" smtClean="0"/>
-              <a:t>14/10/2021</a:t>
+              <a:t>18/10/2021</a:t>
             </a:fld>
             <a:endParaRPr lang="en-GB"/>
           </a:p>
@@ -3028,7 +3027,7 @@
             <a:fld id="{DE72BEAC-A25F-4480-8AFC-1D3E290F2CC8}" type="datetimeFigureOut">
               <a:rPr lang="en-GB" smtClean="0"/>
               <a:pPr/>
-              <a:t>14/10/2021</a:t>
+              <a:t>18/10/2021</a:t>
             </a:fld>
             <a:endParaRPr lang="en-GB"/>
           </a:p>
@@ -4562,22 +4561,9 @@
           <a:lstStyle/>
           <a:p>
             <a:r>
-              <a:rPr lang="pl-PL" dirty="0"/>
-              <a:t>License, </a:t>
-            </a:r>
-            <a:r>
               <a:rPr lang="en-GB" dirty="0"/>
-              <a:t>Copyright and </a:t>
-            </a:r>
-            <a:r>
-              <a:rPr lang="pl-PL" dirty="0"/>
-              <a:t>D</a:t>
-            </a:r>
-            <a:r>
-              <a:rPr lang="en-GB" dirty="0" err="1"/>
-              <a:t>ata</a:t>
-            </a:r>
-            <a:endParaRPr lang="en-GB" dirty="0"/>
+              <a:t>FAIR example</a:t>
+            </a:r>
           </a:p>
         </p:txBody>
       </p:sp>
@@ -4597,65 +4583,76 @@
             <p:ph idx="1"/>
           </p:nvPr>
         </p:nvSpPr>
-        <p:spPr>
-          <a:xfrm>
-            <a:off x="838200" y="1532238"/>
-            <a:ext cx="10515600" cy="5066269"/>
-          </a:xfrm>
-        </p:spPr>
+        <p:spPr/>
         <p:txBody>
           <a:bodyPr>
             <a:normAutofit/>
           </a:bodyPr>
           <a:lstStyle/>
           <a:p>
+            <a:pPr marL="0" indent="0">
+              <a:buNone/>
+            </a:pPr>
             <a:r>
               <a:rPr lang="en-GB" dirty="0"/>
-              <a:t>Software code (the text) gets by default copyright protection which prevents others from copying or modifying it. </a:t>
-            </a:r>
-            <a:br>
-              <a:rPr lang="pl-PL" dirty="0"/>
-            </a:br>
-            <a:r>
-              <a:rPr lang="pl-PL" dirty="0"/>
-              <a:t>Adding an</a:t>
-            </a:r>
-            <a:r>
-              <a:rPr lang="en-GB" dirty="0"/>
-              <a:t> explicit licence is needed to permit re-use.</a:t>
+              <a:t>…</a:t>
             </a:r>
             <a:endParaRPr lang="pl-PL" dirty="0"/>
           </a:p>
           <a:p>
-            <a:r>
-              <a:rPr lang="en-GB" dirty="0"/>
-              <a:t>Data, being factual, cannot be copyrighted. </a:t>
-            </a:r>
+            <a:pPr marL="0" indent="0">
+              <a:buNone/>
+            </a:pPr>
             <a:endParaRPr lang="pl-PL" dirty="0"/>
           </a:p>
           <a:p>
-            <a:r>
-              <a:rPr lang="en-GB" dirty="0"/>
-              <a:t>While the data itself cannot be copyrighted, the way how it is presented can be. The extend of protection is ultimately settled by a court.</a:t>
-            </a:r>
+            <a:pPr marL="0" indent="0">
+              <a:buNone/>
+            </a:pPr>
             <a:endParaRPr lang="pl-PL" dirty="0"/>
           </a:p>
           <a:p>
-            <a:r>
-              <a:rPr lang="pl-PL" dirty="0"/>
-              <a:t>Without licence t</a:t>
-            </a:r>
-            <a:r>
-              <a:rPr lang="en-GB" dirty="0"/>
-              <a:t>he “good actors” will restrain from using your data to avoid “court” risks. </a:t>
-            </a:r>
+            <a:pPr marL="0" indent="0">
+              <a:buNone/>
+            </a:pPr>
+            <a:endParaRPr lang="pl-PL" dirty="0"/>
+          </a:p>
+          <a:p>
+            <a:pPr marL="0" indent="0">
+              <a:buNone/>
+            </a:pPr>
+            <a:endParaRPr lang="pl-PL" dirty="0"/>
+          </a:p>
+          <a:p>
+            <a:pPr marL="0" indent="0">
+              <a:buNone/>
+            </a:pPr>
+            <a:endParaRPr lang="pl-PL" dirty="0"/>
+          </a:p>
+          <a:p>
+            <a:pPr marL="0" indent="0">
+              <a:buNone/>
+            </a:pPr>
+            <a:r>
+              <a:rPr lang="en-GB" dirty="0">
+                <a:hlinkClick r:id="rId2"/>
+              </a:rPr>
+              <a:t>https://synbiohub.org/public/bsu/SubtilinReceiver_spaRK_separated/1</a:t>
+            </a:r>
+            <a:endParaRPr lang="pl-PL" dirty="0"/>
+          </a:p>
+          <a:p>
+            <a:pPr marL="0" indent="0">
+              <a:buNone/>
+            </a:pPr>
+            <a:endParaRPr lang="en-GB" dirty="0"/>
           </a:p>
         </p:txBody>
       </p:sp>
     </p:spTree>
     <p:extLst>
       <p:ext uri="{BB962C8B-B14F-4D97-AF65-F5344CB8AC3E}">
-        <p14:creationId xmlns:p14="http://schemas.microsoft.com/office/powerpoint/2010/main" val="3224048790"/>
+        <p14:creationId xmlns:p14="http://schemas.microsoft.com/office/powerpoint/2010/main" val="2890082546"/>
       </p:ext>
     </p:extLst>
   </p:cSld>
@@ -4687,7 +4684,7 @@
           <p:cNvPr id="2" name="Title 1">
             <a:extLst>
               <a:ext uri="{FF2B5EF4-FFF2-40B4-BE49-F238E27FC236}">
-                <a16:creationId xmlns:a16="http://schemas.microsoft.com/office/drawing/2014/main" id="{DCE85B1F-4F7D-4B0E-B52B-0D935F9C12EE}"/>
+                <a16:creationId xmlns:a16="http://schemas.microsoft.com/office/drawing/2014/main" id="{775BFE92-9990-4094-B7B2-01514614F16E}"/>
               </a:ext>
             </a:extLst>
           </p:cNvPr>
@@ -4705,97 +4702,268 @@
           <a:p>
             <a:r>
               <a:rPr lang="en-GB" dirty="0"/>
-              <a:t>FAIR example</a:t>
-            </a:r>
-          </a:p>
-        </p:txBody>
-      </p:sp>
-      <p:sp>
-        <p:nvSpPr>
-          <p:cNvPr id="6" name="Content Placeholder 5">
-            <a:extLst>
-              <a:ext uri="{FF2B5EF4-FFF2-40B4-BE49-F238E27FC236}">
-                <a16:creationId xmlns:a16="http://schemas.microsoft.com/office/drawing/2014/main" id="{EF786E17-0337-4633-BDF5-676F4C563757}"/>
-              </a:ext>
-            </a:extLst>
-          </p:cNvPr>
-          <p:cNvSpPr>
-            <a:spLocks noGrp="1"/>
-          </p:cNvSpPr>
-          <p:nvPr>
-            <p:ph idx="1"/>
-          </p:nvPr>
-        </p:nvSpPr>
-        <p:spPr/>
-        <p:txBody>
-          <a:bodyPr>
-            <a:normAutofit/>
+              <a:t>FAIR and You</a:t>
+            </a:r>
+          </a:p>
+        </p:txBody>
+      </p:sp>
+      <p:pic>
+        <p:nvPicPr>
+          <p:cNvPr id="4" name="Picture 2" descr="http://2.bp.blogspot.com/-pSVlRf9P_q0/V-zHNtoNHmI/AAAAAAAALGU/mVlaYp0n1DMtmp9rRMtAwV_a0Jj-MD2fwCK4B/s1600/FAIR.png">
+            <a:extLst>
+              <a:ext uri="{FF2B5EF4-FFF2-40B4-BE49-F238E27FC236}">
+                <a16:creationId xmlns:a16="http://schemas.microsoft.com/office/drawing/2014/main" id="{F1145B5C-E672-4E3C-B4D6-B2EC43366A16}"/>
+              </a:ext>
+            </a:extLst>
+          </p:cNvPr>
+          <p:cNvPicPr>
+            <a:picLocks noChangeAspect="1" noChangeArrowheads="1"/>
+          </p:cNvPicPr>
+          <p:nvPr/>
+        </p:nvPicPr>
+        <p:blipFill>
+          <a:blip r:embed="rId2">
+            <a:extLst>
+              <a:ext uri="{28A0092B-C50C-407E-A947-70E740481C1C}">
+                <a14:useLocalDpi xmlns:a14="http://schemas.microsoft.com/office/drawing/2010/main" val="0"/>
+              </a:ext>
+            </a:extLst>
+          </a:blip>
+          <a:srcRect/>
+          <a:stretch>
+            <a:fillRect/>
+          </a:stretch>
+        </p:blipFill>
+        <p:spPr bwMode="auto">
+          <a:xfrm>
+            <a:off x="1326968" y="2190209"/>
+            <a:ext cx="9036496" cy="3066791"/>
+          </a:xfrm>
+          <a:prstGeom prst="rect">
+            <a:avLst/>
+          </a:prstGeom>
+          <a:noFill/>
+          <a:extLst>
+            <a:ext uri="{909E8E84-426E-40DD-AFC4-6F175D3DCCD1}">
+              <a14:hiddenFill xmlns:a14="http://schemas.microsoft.com/office/drawing/2010/main">
+                <a:solidFill>
+                  <a:srgbClr val="FFFFFF"/>
+                </a:solidFill>
+              </a14:hiddenFill>
+            </a:ext>
+          </a:extLst>
+        </p:spPr>
+      </p:pic>
+      <p:sp>
+        <p:nvSpPr>
+          <p:cNvPr id="5" name="Rectangle 4">
+            <a:extLst>
+              <a:ext uri="{FF2B5EF4-FFF2-40B4-BE49-F238E27FC236}">
+                <a16:creationId xmlns:a16="http://schemas.microsoft.com/office/drawing/2014/main" id="{C79D8DC5-0E5F-4B99-900C-3E278A5F248F}"/>
+              </a:ext>
+            </a:extLst>
+          </p:cNvPr>
+          <p:cNvSpPr/>
+          <p:nvPr/>
+        </p:nvSpPr>
+        <p:spPr>
+          <a:xfrm>
+            <a:off x="6096000" y="5244416"/>
+            <a:ext cx="1354858" cy="415498"/>
+          </a:xfrm>
+          <a:prstGeom prst="rect">
+            <a:avLst/>
+          </a:prstGeom>
+        </p:spPr>
+        <p:txBody>
+          <a:bodyPr wrap="none">
+            <a:spAutoFit/>
           </a:bodyPr>
           <a:lstStyle/>
           <a:p>
-            <a:pPr marL="0" indent="0">
-              <a:buNone/>
-            </a:pPr>
-            <a:r>
-              <a:rPr lang="en-GB" dirty="0"/>
-              <a:t>…</a:t>
-            </a:r>
-            <a:endParaRPr lang="pl-PL" dirty="0"/>
-          </a:p>
-          <a:p>
-            <a:pPr marL="0" indent="0">
-              <a:buNone/>
-            </a:pPr>
-            <a:endParaRPr lang="pl-PL" dirty="0"/>
-          </a:p>
-          <a:p>
-            <a:pPr marL="0" indent="0">
-              <a:buNone/>
-            </a:pPr>
-            <a:endParaRPr lang="pl-PL" dirty="0"/>
-          </a:p>
-          <a:p>
-            <a:pPr marL="0" indent="0">
-              <a:buNone/>
-            </a:pPr>
-            <a:endParaRPr lang="pl-PL" dirty="0"/>
-          </a:p>
-          <a:p>
-            <a:pPr marL="0" indent="0">
-              <a:buNone/>
-            </a:pPr>
-            <a:endParaRPr lang="pl-PL" dirty="0"/>
-          </a:p>
-          <a:p>
-            <a:pPr marL="0" indent="0">
-              <a:buNone/>
-            </a:pPr>
-            <a:endParaRPr lang="pl-PL" dirty="0"/>
-          </a:p>
-          <a:p>
-            <a:pPr marL="0" indent="0">
-              <a:buNone/>
-            </a:pPr>
-            <a:r>
-              <a:rPr lang="en-GB" dirty="0">
-                <a:hlinkClick r:id="rId2"/>
+            <a:r>
+              <a:rPr lang="en-GB" sz="2100" dirty="0">
+                <a:solidFill>
+                  <a:schemeClr val="tx2">
+                    <a:lumMod val="60000"/>
+                    <a:lumOff val="40000"/>
+                  </a:schemeClr>
+                </a:solidFill>
+                <a:latin typeface="Corbel" panose="020B0503020204020204" pitchFamily="34" charset="0"/>
               </a:rPr>
-              <a:t>https://synbiohub.org/public/bsu/SubtilinReceiver_spaRK_separated/1</a:t>
-            </a:r>
-            <a:endParaRPr lang="pl-PL" dirty="0"/>
-          </a:p>
-          <a:p>
-            <a:pPr marL="0" indent="0">
-              <a:buNone/>
-            </a:pPr>
-            <a:endParaRPr lang="en-GB" dirty="0"/>
+              <a:t>Intelligible</a:t>
+            </a:r>
+          </a:p>
+        </p:txBody>
+      </p:sp>
+      <p:sp>
+        <p:nvSpPr>
+          <p:cNvPr id="6" name="Rectangle 5">
+            <a:extLst>
+              <a:ext uri="{FF2B5EF4-FFF2-40B4-BE49-F238E27FC236}">
+                <a16:creationId xmlns:a16="http://schemas.microsoft.com/office/drawing/2014/main" id="{F1F2D28B-48FB-4842-BF60-77A16A3FBD58}"/>
+              </a:ext>
+            </a:extLst>
+          </p:cNvPr>
+          <p:cNvSpPr/>
+          <p:nvPr/>
+        </p:nvSpPr>
+        <p:spPr>
+          <a:xfrm>
+            <a:off x="8210279" y="5257000"/>
+            <a:ext cx="1655774" cy="415498"/>
+          </a:xfrm>
+          <a:prstGeom prst="rect">
+            <a:avLst/>
+          </a:prstGeom>
+          <a:solidFill>
+            <a:schemeClr val="bg1"/>
+          </a:solidFill>
+        </p:spPr>
+        <p:txBody>
+          <a:bodyPr wrap="none">
+            <a:spAutoFit/>
+          </a:bodyPr>
+          <a:lstStyle/>
+          <a:p>
+            <a:r>
+              <a:rPr lang="en-GB" sz="2100" dirty="0">
+                <a:solidFill>
+                  <a:schemeClr val="tx2">
+                    <a:lumMod val="60000"/>
+                    <a:lumOff val="40000"/>
+                  </a:schemeClr>
+                </a:solidFill>
+                <a:latin typeface="Corbel" panose="020B0503020204020204" pitchFamily="34" charset="0"/>
+              </a:rPr>
+              <a:t>Reproducible</a:t>
+            </a:r>
+          </a:p>
+        </p:txBody>
+      </p:sp>
+      <p:sp>
+        <p:nvSpPr>
+          <p:cNvPr id="7" name="Rectangle 6">
+            <a:extLst>
+              <a:ext uri="{FF2B5EF4-FFF2-40B4-BE49-F238E27FC236}">
+                <a16:creationId xmlns:a16="http://schemas.microsoft.com/office/drawing/2014/main" id="{725D77CC-C0EF-4659-87DC-E623FBCA6E30}"/>
+              </a:ext>
+            </a:extLst>
+          </p:cNvPr>
+          <p:cNvSpPr/>
+          <p:nvPr/>
+        </p:nvSpPr>
+        <p:spPr>
+          <a:xfrm>
+            <a:off x="1988588" y="5257000"/>
+            <a:ext cx="971741" cy="415498"/>
+          </a:xfrm>
+          <a:prstGeom prst="rect">
+            <a:avLst/>
+          </a:prstGeom>
+        </p:spPr>
+        <p:txBody>
+          <a:bodyPr wrap="none">
+            <a:spAutoFit/>
+          </a:bodyPr>
+          <a:lstStyle/>
+          <a:p>
+            <a:r>
+              <a:rPr lang="en-GB" sz="2100" dirty="0">
+                <a:solidFill>
+                  <a:schemeClr val="tx2">
+                    <a:lumMod val="60000"/>
+                    <a:lumOff val="40000"/>
+                  </a:schemeClr>
+                </a:solidFill>
+                <a:latin typeface="Corbel" panose="020B0503020204020204" pitchFamily="34" charset="0"/>
+              </a:rPr>
+              <a:t>Citable</a:t>
+            </a:r>
+          </a:p>
+        </p:txBody>
+      </p:sp>
+      <p:sp>
+        <p:nvSpPr>
+          <p:cNvPr id="8" name="Rectangle 7">
+            <a:extLst>
+              <a:ext uri="{FF2B5EF4-FFF2-40B4-BE49-F238E27FC236}">
+                <a16:creationId xmlns:a16="http://schemas.microsoft.com/office/drawing/2014/main" id="{C66A31C1-ACF8-4FA1-AF05-7B006780E7B3}"/>
+              </a:ext>
+            </a:extLst>
+          </p:cNvPr>
+          <p:cNvSpPr/>
+          <p:nvPr/>
+        </p:nvSpPr>
+        <p:spPr>
+          <a:xfrm>
+            <a:off x="3440316" y="5257000"/>
+            <a:ext cx="2216889" cy="415498"/>
+          </a:xfrm>
+          <a:prstGeom prst="rect">
+            <a:avLst/>
+          </a:prstGeom>
+        </p:spPr>
+        <p:txBody>
+          <a:bodyPr wrap="none">
+            <a:spAutoFit/>
+          </a:bodyPr>
+          <a:lstStyle/>
+          <a:p>
+            <a:r>
+              <a:rPr lang="en-GB" sz="2100" dirty="0">
+                <a:solidFill>
+                  <a:schemeClr val="tx2">
+                    <a:lumMod val="60000"/>
+                    <a:lumOff val="40000"/>
+                  </a:schemeClr>
+                </a:solidFill>
+                <a:latin typeface="Corbel" panose="020B0503020204020204" pitchFamily="34" charset="0"/>
+              </a:rPr>
+              <a:t>Track &amp; Countable</a:t>
+            </a:r>
+          </a:p>
+        </p:txBody>
+      </p:sp>
+      <p:sp>
+        <p:nvSpPr>
+          <p:cNvPr id="9" name="TextBox 8">
+            <a:extLst>
+              <a:ext uri="{FF2B5EF4-FFF2-40B4-BE49-F238E27FC236}">
+                <a16:creationId xmlns:a16="http://schemas.microsoft.com/office/drawing/2014/main" id="{83A55002-18C5-4D7D-B132-2D7C4273B10D}"/>
+              </a:ext>
+            </a:extLst>
+          </p:cNvPr>
+          <p:cNvSpPr txBox="1"/>
+          <p:nvPr/>
+        </p:nvSpPr>
+        <p:spPr>
+          <a:xfrm>
+            <a:off x="0" y="6492875"/>
+            <a:ext cx="1485215" cy="307777"/>
+          </a:xfrm>
+          <a:prstGeom prst="rect">
+            <a:avLst/>
+          </a:prstGeom>
+          <a:noFill/>
+        </p:spPr>
+        <p:txBody>
+          <a:bodyPr wrap="none" rtlCol="0">
+            <a:spAutoFit/>
+          </a:bodyPr>
+          <a:lstStyle/>
+          <a:p>
+            <a:r>
+              <a:rPr lang="en-GB" sz="1400" dirty="0"/>
+              <a:t>CREDITS [5] CC BY</a:t>
+            </a:r>
           </a:p>
         </p:txBody>
       </p:sp>
     </p:spTree>
     <p:extLst>
       <p:ext uri="{BB962C8B-B14F-4D97-AF65-F5344CB8AC3E}">
-        <p14:creationId xmlns:p14="http://schemas.microsoft.com/office/powerpoint/2010/main" val="2890082546"/>
+        <p14:creationId xmlns:p14="http://schemas.microsoft.com/office/powerpoint/2010/main" val="3383671659"/>
       </p:ext>
     </p:extLst>
   </p:cSld>
@@ -4827,317 +4995,6 @@
           <p:cNvPr id="2" name="Title 1">
             <a:extLst>
               <a:ext uri="{FF2B5EF4-FFF2-40B4-BE49-F238E27FC236}">
-                <a16:creationId xmlns:a16="http://schemas.microsoft.com/office/drawing/2014/main" id="{775BFE92-9990-4094-B7B2-01514614F16E}"/>
-              </a:ext>
-            </a:extLst>
-          </p:cNvPr>
-          <p:cNvSpPr>
-            <a:spLocks noGrp="1"/>
-          </p:cNvSpPr>
-          <p:nvPr>
-            <p:ph type="title"/>
-          </p:nvPr>
-        </p:nvSpPr>
-        <p:spPr/>
-        <p:txBody>
-          <a:bodyPr/>
-          <a:lstStyle/>
-          <a:p>
-            <a:r>
-              <a:rPr lang="en-GB" dirty="0"/>
-              <a:t>FAIR and You</a:t>
-            </a:r>
-          </a:p>
-        </p:txBody>
-      </p:sp>
-      <p:pic>
-        <p:nvPicPr>
-          <p:cNvPr id="4" name="Picture 2" descr="http://2.bp.blogspot.com/-pSVlRf9P_q0/V-zHNtoNHmI/AAAAAAAALGU/mVlaYp0n1DMtmp9rRMtAwV_a0Jj-MD2fwCK4B/s1600/FAIR.png">
-            <a:extLst>
-              <a:ext uri="{FF2B5EF4-FFF2-40B4-BE49-F238E27FC236}">
-                <a16:creationId xmlns:a16="http://schemas.microsoft.com/office/drawing/2014/main" id="{F1145B5C-E672-4E3C-B4D6-B2EC43366A16}"/>
-              </a:ext>
-            </a:extLst>
-          </p:cNvPr>
-          <p:cNvPicPr>
-            <a:picLocks noChangeAspect="1" noChangeArrowheads="1"/>
-          </p:cNvPicPr>
-          <p:nvPr/>
-        </p:nvPicPr>
-        <p:blipFill>
-          <a:blip r:embed="rId2">
-            <a:extLst>
-              <a:ext uri="{28A0092B-C50C-407E-A947-70E740481C1C}">
-                <a14:useLocalDpi xmlns:a14="http://schemas.microsoft.com/office/drawing/2010/main" val="0"/>
-              </a:ext>
-            </a:extLst>
-          </a:blip>
-          <a:srcRect/>
-          <a:stretch>
-            <a:fillRect/>
-          </a:stretch>
-        </p:blipFill>
-        <p:spPr bwMode="auto">
-          <a:xfrm>
-            <a:off x="1326968" y="2190209"/>
-            <a:ext cx="9036496" cy="3066791"/>
-          </a:xfrm>
-          <a:prstGeom prst="rect">
-            <a:avLst/>
-          </a:prstGeom>
-          <a:noFill/>
-          <a:extLst>
-            <a:ext uri="{909E8E84-426E-40DD-AFC4-6F175D3DCCD1}">
-              <a14:hiddenFill xmlns:a14="http://schemas.microsoft.com/office/drawing/2010/main">
-                <a:solidFill>
-                  <a:srgbClr val="FFFFFF"/>
-                </a:solidFill>
-              </a14:hiddenFill>
-            </a:ext>
-          </a:extLst>
-        </p:spPr>
-      </p:pic>
-      <p:sp>
-        <p:nvSpPr>
-          <p:cNvPr id="5" name="Rectangle 4">
-            <a:extLst>
-              <a:ext uri="{FF2B5EF4-FFF2-40B4-BE49-F238E27FC236}">
-                <a16:creationId xmlns:a16="http://schemas.microsoft.com/office/drawing/2014/main" id="{C79D8DC5-0E5F-4B99-900C-3E278A5F248F}"/>
-              </a:ext>
-            </a:extLst>
-          </p:cNvPr>
-          <p:cNvSpPr/>
-          <p:nvPr/>
-        </p:nvSpPr>
-        <p:spPr>
-          <a:xfrm>
-            <a:off x="6096000" y="5244416"/>
-            <a:ext cx="1354858" cy="415498"/>
-          </a:xfrm>
-          <a:prstGeom prst="rect">
-            <a:avLst/>
-          </a:prstGeom>
-        </p:spPr>
-        <p:txBody>
-          <a:bodyPr wrap="none">
-            <a:spAutoFit/>
-          </a:bodyPr>
-          <a:lstStyle/>
-          <a:p>
-            <a:r>
-              <a:rPr lang="en-GB" sz="2100" dirty="0">
-                <a:solidFill>
-                  <a:schemeClr val="tx2">
-                    <a:lumMod val="60000"/>
-                    <a:lumOff val="40000"/>
-                  </a:schemeClr>
-                </a:solidFill>
-                <a:latin typeface="Corbel" panose="020B0503020204020204" pitchFamily="34" charset="0"/>
-              </a:rPr>
-              <a:t>Intelligible</a:t>
-            </a:r>
-          </a:p>
-        </p:txBody>
-      </p:sp>
-      <p:sp>
-        <p:nvSpPr>
-          <p:cNvPr id="6" name="Rectangle 5">
-            <a:extLst>
-              <a:ext uri="{FF2B5EF4-FFF2-40B4-BE49-F238E27FC236}">
-                <a16:creationId xmlns:a16="http://schemas.microsoft.com/office/drawing/2014/main" id="{F1F2D28B-48FB-4842-BF60-77A16A3FBD58}"/>
-              </a:ext>
-            </a:extLst>
-          </p:cNvPr>
-          <p:cNvSpPr/>
-          <p:nvPr/>
-        </p:nvSpPr>
-        <p:spPr>
-          <a:xfrm>
-            <a:off x="8210279" y="5257000"/>
-            <a:ext cx="1655774" cy="415498"/>
-          </a:xfrm>
-          <a:prstGeom prst="rect">
-            <a:avLst/>
-          </a:prstGeom>
-          <a:solidFill>
-            <a:schemeClr val="bg1"/>
-          </a:solidFill>
-        </p:spPr>
-        <p:txBody>
-          <a:bodyPr wrap="none">
-            <a:spAutoFit/>
-          </a:bodyPr>
-          <a:lstStyle/>
-          <a:p>
-            <a:r>
-              <a:rPr lang="en-GB" sz="2100" dirty="0">
-                <a:solidFill>
-                  <a:schemeClr val="tx2">
-                    <a:lumMod val="60000"/>
-                    <a:lumOff val="40000"/>
-                  </a:schemeClr>
-                </a:solidFill>
-                <a:latin typeface="Corbel" panose="020B0503020204020204" pitchFamily="34" charset="0"/>
-              </a:rPr>
-              <a:t>Reproducible</a:t>
-            </a:r>
-          </a:p>
-        </p:txBody>
-      </p:sp>
-      <p:sp>
-        <p:nvSpPr>
-          <p:cNvPr id="7" name="Rectangle 6">
-            <a:extLst>
-              <a:ext uri="{FF2B5EF4-FFF2-40B4-BE49-F238E27FC236}">
-                <a16:creationId xmlns:a16="http://schemas.microsoft.com/office/drawing/2014/main" id="{725D77CC-C0EF-4659-87DC-E623FBCA6E30}"/>
-              </a:ext>
-            </a:extLst>
-          </p:cNvPr>
-          <p:cNvSpPr/>
-          <p:nvPr/>
-        </p:nvSpPr>
-        <p:spPr>
-          <a:xfrm>
-            <a:off x="1988588" y="5257000"/>
-            <a:ext cx="971741" cy="415498"/>
-          </a:xfrm>
-          <a:prstGeom prst="rect">
-            <a:avLst/>
-          </a:prstGeom>
-        </p:spPr>
-        <p:txBody>
-          <a:bodyPr wrap="none">
-            <a:spAutoFit/>
-          </a:bodyPr>
-          <a:lstStyle/>
-          <a:p>
-            <a:r>
-              <a:rPr lang="en-GB" sz="2100" dirty="0">
-                <a:solidFill>
-                  <a:schemeClr val="tx2">
-                    <a:lumMod val="60000"/>
-                    <a:lumOff val="40000"/>
-                  </a:schemeClr>
-                </a:solidFill>
-                <a:latin typeface="Corbel" panose="020B0503020204020204" pitchFamily="34" charset="0"/>
-              </a:rPr>
-              <a:t>Citable</a:t>
-            </a:r>
-          </a:p>
-        </p:txBody>
-      </p:sp>
-      <p:sp>
-        <p:nvSpPr>
-          <p:cNvPr id="8" name="Rectangle 7">
-            <a:extLst>
-              <a:ext uri="{FF2B5EF4-FFF2-40B4-BE49-F238E27FC236}">
-                <a16:creationId xmlns:a16="http://schemas.microsoft.com/office/drawing/2014/main" id="{C66A31C1-ACF8-4FA1-AF05-7B006780E7B3}"/>
-              </a:ext>
-            </a:extLst>
-          </p:cNvPr>
-          <p:cNvSpPr/>
-          <p:nvPr/>
-        </p:nvSpPr>
-        <p:spPr>
-          <a:xfrm>
-            <a:off x="3440316" y="5257000"/>
-            <a:ext cx="2216889" cy="415498"/>
-          </a:xfrm>
-          <a:prstGeom prst="rect">
-            <a:avLst/>
-          </a:prstGeom>
-        </p:spPr>
-        <p:txBody>
-          <a:bodyPr wrap="none">
-            <a:spAutoFit/>
-          </a:bodyPr>
-          <a:lstStyle/>
-          <a:p>
-            <a:r>
-              <a:rPr lang="en-GB" sz="2100" dirty="0">
-                <a:solidFill>
-                  <a:schemeClr val="tx2">
-                    <a:lumMod val="60000"/>
-                    <a:lumOff val="40000"/>
-                  </a:schemeClr>
-                </a:solidFill>
-                <a:latin typeface="Corbel" panose="020B0503020204020204" pitchFamily="34" charset="0"/>
-              </a:rPr>
-              <a:t>Track &amp; Countable</a:t>
-            </a:r>
-          </a:p>
-        </p:txBody>
-      </p:sp>
-      <p:sp>
-        <p:nvSpPr>
-          <p:cNvPr id="9" name="TextBox 8">
-            <a:extLst>
-              <a:ext uri="{FF2B5EF4-FFF2-40B4-BE49-F238E27FC236}">
-                <a16:creationId xmlns:a16="http://schemas.microsoft.com/office/drawing/2014/main" id="{83A55002-18C5-4D7D-B132-2D7C4273B10D}"/>
-              </a:ext>
-            </a:extLst>
-          </p:cNvPr>
-          <p:cNvSpPr txBox="1"/>
-          <p:nvPr/>
-        </p:nvSpPr>
-        <p:spPr>
-          <a:xfrm>
-            <a:off x="0" y="6492875"/>
-            <a:ext cx="1485215" cy="307777"/>
-          </a:xfrm>
-          <a:prstGeom prst="rect">
-            <a:avLst/>
-          </a:prstGeom>
-          <a:noFill/>
-        </p:spPr>
-        <p:txBody>
-          <a:bodyPr wrap="none" rtlCol="0">
-            <a:spAutoFit/>
-          </a:bodyPr>
-          <a:lstStyle/>
-          <a:p>
-            <a:r>
-              <a:rPr lang="en-GB" sz="1400" dirty="0"/>
-              <a:t>CREDITS [5] CC BY</a:t>
-            </a:r>
-          </a:p>
-        </p:txBody>
-      </p:sp>
-    </p:spTree>
-    <p:extLst>
-      <p:ext uri="{BB962C8B-B14F-4D97-AF65-F5344CB8AC3E}">
-        <p14:creationId xmlns:p14="http://schemas.microsoft.com/office/powerpoint/2010/main" val="3383671659"/>
-      </p:ext>
-    </p:extLst>
-  </p:cSld>
-  <p:clrMapOvr>
-    <a:masterClrMapping/>
-  </p:clrMapOvr>
-</p:sld>
-</file>
-
-<file path=ppt/slides/slide18.xml><?xml version="1.0" encoding="utf-8"?>
-<p:sld xmlns:a="http://schemas.openxmlformats.org/drawingml/2006/main" xmlns:r="http://schemas.openxmlformats.org/officeDocument/2006/relationships" xmlns:p="http://schemas.openxmlformats.org/presentationml/2006/main">
-  <p:cSld>
-    <p:spTree>
-      <p:nvGrpSpPr>
-        <p:cNvPr id="1" name=""/>
-        <p:cNvGrpSpPr/>
-        <p:nvPr/>
-      </p:nvGrpSpPr>
-      <p:grpSpPr>
-        <a:xfrm>
-          <a:off x="0" y="0"/>
-          <a:ext cx="0" cy="0"/>
-          <a:chOff x="0" y="0"/>
-          <a:chExt cx="0" cy="0"/>
-        </a:xfrm>
-      </p:grpSpPr>
-      <p:sp>
-        <p:nvSpPr>
-          <p:cNvPr id="2" name="Title 1">
-            <a:extLst>
-              <a:ext uri="{FF2B5EF4-FFF2-40B4-BE49-F238E27FC236}">
                 <a16:creationId xmlns:a16="http://schemas.microsoft.com/office/drawing/2014/main" id="{DCE85B1F-4F7D-4B0E-B52B-0D935F9C12EE}"/>
               </a:ext>
             </a:extLst>
@@ -5240,7 +5097,7 @@
 </p:sld>
 </file>
 
-<file path=ppt/slides/slide19.xml><?xml version="1.0" encoding="utf-8"?>
+<file path=ppt/slides/slide18.xml><?xml version="1.0" encoding="utf-8"?>
 <p:sld xmlns:a="http://schemas.openxmlformats.org/drawingml/2006/main" xmlns:r="http://schemas.openxmlformats.org/officeDocument/2006/relationships" xmlns:p="http://schemas.openxmlformats.org/presentationml/2006/main">
   <p:cSld>
     <p:bg>

</xml_diff>